<commit_message>
ajout documentation .pdf modification du powerpoint
</commit_message>
<xml_diff>
--- a/maquette/Attribution des places de parking.pptx
+++ b/maquette/Attribution des places de parking.pptx
@@ -8,10 +8,10 @@
     <p:sldId id="256" r:id="rId2"/>
     <p:sldId id="257" r:id="rId3"/>
     <p:sldId id="258" r:id="rId4"/>
-    <p:sldId id="263" r:id="rId5"/>
-    <p:sldId id="259" r:id="rId6"/>
-    <p:sldId id="260" r:id="rId7"/>
-    <p:sldId id="261" r:id="rId8"/>
+    <p:sldId id="261" r:id="rId5"/>
+    <p:sldId id="263" r:id="rId6"/>
+    <p:sldId id="259" r:id="rId7"/>
+    <p:sldId id="260" r:id="rId8"/>
     <p:sldId id="262" r:id="rId9"/>
     <p:sldId id="264" r:id="rId10"/>
   </p:sldIdLst>
@@ -10384,7 +10384,7 @@
           <a:p>
             <a:fld id="{C6428AAD-274D-43C8-A645-408DA2E90684}" type="datetimeFigureOut">
               <a:rPr lang="fr-FR" smtClean="0"/>
-              <a:t>26/09/2018</a:t>
+              <a:t>28/09/2018</a:t>
             </a:fld>
             <a:endParaRPr lang="fr-FR"/>
           </a:p>
@@ -10456,7 +10456,7 @@
           <a:p>
             <a:fld id="{8D313757-5B57-4151-A971-17F3423A5DDE}" type="slidenum">
               <a:rPr lang="fr-FR" smtClean="0"/>
-              <a:t>‹#›</a:t>
+              <a:t>‹N°›</a:t>
             </a:fld>
             <a:endParaRPr lang="fr-FR"/>
           </a:p>
@@ -10627,7 +10627,7 @@
           <a:p>
             <a:fld id="{C6428AAD-274D-43C8-A645-408DA2E90684}" type="datetimeFigureOut">
               <a:rPr lang="fr-FR" smtClean="0"/>
-              <a:t>26/09/2018</a:t>
+              <a:t>28/09/2018</a:t>
             </a:fld>
             <a:endParaRPr lang="fr-FR"/>
           </a:p>
@@ -10669,7 +10669,7 @@
           <a:p>
             <a:fld id="{8D313757-5B57-4151-A971-17F3423A5DDE}" type="slidenum">
               <a:rPr lang="fr-FR" smtClean="0"/>
-              <a:t>‹#›</a:t>
+              <a:t>‹N°›</a:t>
             </a:fld>
             <a:endParaRPr lang="fr-FR"/>
           </a:p>
@@ -10807,7 +10807,7 @@
           <a:p>
             <a:fld id="{C6428AAD-274D-43C8-A645-408DA2E90684}" type="datetimeFigureOut">
               <a:rPr lang="fr-FR" smtClean="0"/>
-              <a:t>26/09/2018</a:t>
+              <a:t>28/09/2018</a:t>
             </a:fld>
             <a:endParaRPr lang="fr-FR"/>
           </a:p>
@@ -10849,7 +10849,7 @@
           <a:p>
             <a:fld id="{8D313757-5B57-4151-A971-17F3423A5DDE}" type="slidenum">
               <a:rPr lang="fr-FR" smtClean="0"/>
-              <a:t>‹#›</a:t>
+              <a:t>‹N°›</a:t>
             </a:fld>
             <a:endParaRPr lang="fr-FR"/>
           </a:p>
@@ -10977,7 +10977,7 @@
           <a:p>
             <a:fld id="{C6428AAD-274D-43C8-A645-408DA2E90684}" type="datetimeFigureOut">
               <a:rPr lang="fr-FR" smtClean="0"/>
-              <a:t>26/09/2018</a:t>
+              <a:t>28/09/2018</a:t>
             </a:fld>
             <a:endParaRPr lang="fr-FR"/>
           </a:p>
@@ -11019,7 +11019,7 @@
           <a:p>
             <a:fld id="{8D313757-5B57-4151-A971-17F3423A5DDE}" type="slidenum">
               <a:rPr lang="fr-FR" smtClean="0"/>
-              <a:t>‹#›</a:t>
+              <a:t>‹N°›</a:t>
             </a:fld>
             <a:endParaRPr lang="fr-FR"/>
           </a:p>
@@ -11253,7 +11253,7 @@
           <a:p>
             <a:fld id="{C6428AAD-274D-43C8-A645-408DA2E90684}" type="datetimeFigureOut">
               <a:rPr lang="fr-FR" smtClean="0"/>
-              <a:t>26/09/2018</a:t>
+              <a:t>28/09/2018</a:t>
             </a:fld>
             <a:endParaRPr lang="fr-FR"/>
           </a:p>
@@ -11321,7 +11321,7 @@
           <a:p>
             <a:fld id="{8D313757-5B57-4151-A971-17F3423A5DDE}" type="slidenum">
               <a:rPr lang="fr-FR" smtClean="0"/>
-              <a:t>‹#›</a:t>
+              <a:t>‹N°›</a:t>
             </a:fld>
             <a:endParaRPr lang="fr-FR"/>
           </a:p>
@@ -12454,7 +12454,7 @@
           <a:p>
             <a:fld id="{C6428AAD-274D-43C8-A645-408DA2E90684}" type="datetimeFigureOut">
               <a:rPr lang="fr-FR" smtClean="0"/>
-              <a:t>26/09/2018</a:t>
+              <a:t>28/09/2018</a:t>
             </a:fld>
             <a:endParaRPr lang="fr-FR"/>
           </a:p>
@@ -12496,7 +12496,7 @@
           <a:p>
             <a:fld id="{8D313757-5B57-4151-A971-17F3423A5DDE}" type="slidenum">
               <a:rPr lang="fr-FR" smtClean="0"/>
-              <a:t>‹#›</a:t>
+              <a:t>‹N°›</a:t>
             </a:fld>
             <a:endParaRPr lang="fr-FR"/>
           </a:p>
@@ -12844,7 +12844,7 @@
           <a:p>
             <a:fld id="{C6428AAD-274D-43C8-A645-408DA2E90684}" type="datetimeFigureOut">
               <a:rPr lang="fr-FR" smtClean="0"/>
-              <a:t>26/09/2018</a:t>
+              <a:t>28/09/2018</a:t>
             </a:fld>
             <a:endParaRPr lang="fr-FR"/>
           </a:p>
@@ -12886,7 +12886,7 @@
           <a:p>
             <a:fld id="{8D313757-5B57-4151-A971-17F3423A5DDE}" type="slidenum">
               <a:rPr lang="fr-FR" smtClean="0"/>
-              <a:t>‹#›</a:t>
+              <a:t>‹N°›</a:t>
             </a:fld>
             <a:endParaRPr lang="fr-FR"/>
           </a:p>
@@ -12967,7 +12967,7 @@
           <a:p>
             <a:fld id="{C6428AAD-274D-43C8-A645-408DA2E90684}" type="datetimeFigureOut">
               <a:rPr lang="fr-FR" smtClean="0"/>
-              <a:t>26/09/2018</a:t>
+              <a:t>28/09/2018</a:t>
             </a:fld>
             <a:endParaRPr lang="fr-FR"/>
           </a:p>
@@ -13009,7 +13009,7 @@
           <a:p>
             <a:fld id="{8D313757-5B57-4151-A971-17F3423A5DDE}" type="slidenum">
               <a:rPr lang="fr-FR" smtClean="0"/>
-              <a:t>‹#›</a:t>
+              <a:t>‹N°›</a:t>
             </a:fld>
             <a:endParaRPr lang="fr-FR"/>
           </a:p>
@@ -13062,7 +13062,7 @@
           <a:p>
             <a:fld id="{C6428AAD-274D-43C8-A645-408DA2E90684}" type="datetimeFigureOut">
               <a:rPr lang="fr-FR" smtClean="0"/>
-              <a:t>26/09/2018</a:t>
+              <a:t>28/09/2018</a:t>
             </a:fld>
             <a:endParaRPr lang="fr-FR"/>
           </a:p>
@@ -13104,7 +13104,7 @@
           <a:p>
             <a:fld id="{8D313757-5B57-4151-A971-17F3423A5DDE}" type="slidenum">
               <a:rPr lang="fr-FR" smtClean="0"/>
-              <a:t>‹#›</a:t>
+              <a:t>‹N°›</a:t>
             </a:fld>
             <a:endParaRPr lang="fr-FR"/>
           </a:p>
@@ -13830,7 +13830,7 @@
           <a:p>
             <a:fld id="{C6428AAD-274D-43C8-A645-408DA2E90684}" type="datetimeFigureOut">
               <a:rPr lang="fr-FR" smtClean="0"/>
-              <a:t>26/09/2018</a:t>
+              <a:t>28/09/2018</a:t>
             </a:fld>
             <a:endParaRPr lang="fr-FR"/>
           </a:p>
@@ -13882,7 +13882,7 @@
           <a:p>
             <a:fld id="{8D313757-5B57-4151-A971-17F3423A5DDE}" type="slidenum">
               <a:rPr lang="fr-FR" smtClean="0"/>
-              <a:t>‹#›</a:t>
+              <a:t>‹N°›</a:t>
             </a:fld>
             <a:endParaRPr lang="fr-FR"/>
           </a:p>
@@ -14670,7 +14670,7 @@
           <a:p>
             <a:fld id="{C6428AAD-274D-43C8-A645-408DA2E90684}" type="datetimeFigureOut">
               <a:rPr lang="fr-FR" smtClean="0"/>
-              <a:t>26/09/2018</a:t>
+              <a:t>28/09/2018</a:t>
             </a:fld>
             <a:endParaRPr lang="fr-FR"/>
           </a:p>
@@ -14722,7 +14722,7 @@
           <a:p>
             <a:fld id="{8D313757-5B57-4151-A971-17F3423A5DDE}" type="slidenum">
               <a:rPr lang="fr-FR" smtClean="0"/>
-              <a:t>‹#›</a:t>
+              <a:t>‹N°›</a:t>
             </a:fld>
             <a:endParaRPr lang="fr-FR"/>
           </a:p>
@@ -14897,7 +14897,7 @@
           <a:p>
             <a:fld id="{C6428AAD-274D-43C8-A645-408DA2E90684}" type="datetimeFigureOut">
               <a:rPr lang="fr-FR" smtClean="0"/>
-              <a:t>26/09/2018</a:t>
+              <a:t>28/09/2018</a:t>
             </a:fld>
             <a:endParaRPr lang="fr-FR"/>
           </a:p>
@@ -14977,7 +14977,7 @@
           <a:p>
             <a:fld id="{8D313757-5B57-4151-A971-17F3423A5DDE}" type="slidenum">
               <a:rPr lang="fr-FR" smtClean="0"/>
-              <a:t>‹#›</a:t>
+              <a:t>‹N°›</a:t>
             </a:fld>
             <a:endParaRPr lang="fr-FR"/>
           </a:p>
@@ -16158,7 +16158,7 @@
                   <a:reflection blurRad="6350" stA="53000" endA="300" endPos="35500" dir="5400000" sy="-90000" algn="bl" rotWithShape="0"/>
                 </a:effectLst>
               </a:rPr>
-              <a:t>Présentation du projet 	   Répartition des tâches</a:t>
+              <a:t>Présentation du projet 	   MCD</a:t>
             </a:r>
           </a:p>
           <a:p>
@@ -16175,7 +16175,7 @@
                   <a:reflection blurRad="6350" stA="53000" endA="300" endPos="35500" dir="5400000" sy="-90000" algn="bl" rotWithShape="0"/>
                 </a:effectLst>
               </a:rPr>
-              <a:t>	 Planning		 	   Langages utilisés</a:t>
+              <a:t>	 Répartition des tâches	   Langages utilisés</a:t>
             </a:r>
           </a:p>
           <a:p>
@@ -16192,7 +16192,7 @@
                   <a:reflection blurRad="6350" stA="53000" endA="300" endPos="35500" dir="5400000" sy="-90000" algn="bl" rotWithShape="0"/>
                 </a:effectLst>
               </a:rPr>
-              <a:t>	 Maquette			   Conclusion</a:t>
+              <a:t>	 Planning			   Conclusion</a:t>
             </a:r>
           </a:p>
           <a:p>
@@ -16209,7 +16209,7 @@
                   <a:reflection blurRad="6350" stA="53000" endA="300" endPos="35500" dir="5400000" sy="-90000" algn="bl" rotWithShape="0"/>
                 </a:effectLst>
               </a:rPr>
-              <a:t>	 MCD	    </a:t>
+              <a:t>	 Maquette	    </a:t>
             </a:r>
           </a:p>
           <a:p>
@@ -16793,565 +16793,6 @@
           <p:cNvPr id="2" name="Title 1">
             <a:extLst>
               <a:ext uri="{FF2B5EF4-FFF2-40B4-BE49-F238E27FC236}">
-                <a16:creationId xmlns:a16="http://schemas.microsoft.com/office/drawing/2014/main" id="{51E19303-39C9-49E1-9B63-CB0E4873C9ED}"/>
-              </a:ext>
-            </a:extLst>
-          </p:cNvPr>
-          <p:cNvSpPr>
-            <a:spLocks noGrp="1"/>
-          </p:cNvSpPr>
-          <p:nvPr>
-            <p:ph type="title"/>
-          </p:nvPr>
-        </p:nvSpPr>
-        <p:spPr/>
-        <p:txBody>
-          <a:bodyPr/>
-          <a:lstStyle/>
-          <a:p>
-            <a:r>
-              <a:rPr lang="fr-FR" dirty="0"/>
-              <a:t>	    planning</a:t>
-            </a:r>
-          </a:p>
-        </p:txBody>
-      </p:sp>
-      <p:pic>
-        <p:nvPicPr>
-          <p:cNvPr id="5" name="Content Placeholder 4">
-            <a:extLst>
-              <a:ext uri="{FF2B5EF4-FFF2-40B4-BE49-F238E27FC236}">
-                <a16:creationId xmlns:a16="http://schemas.microsoft.com/office/drawing/2014/main" id="{F35E130C-74BD-4E85-B425-04336B91E7BA}"/>
-              </a:ext>
-            </a:extLst>
-          </p:cNvPr>
-          <p:cNvPicPr>
-            <a:picLocks noGrp="1" noChangeAspect="1"/>
-          </p:cNvPicPr>
-          <p:nvPr>
-            <p:ph idx="1"/>
-          </p:nvPr>
-        </p:nvPicPr>
-        <p:blipFill>
-          <a:blip r:embed="rId2">
-            <a:extLst>
-              <a:ext uri="{28A0092B-C50C-407E-A947-70E740481C1C}">
-                <a14:useLocalDpi xmlns:a14="http://schemas.microsoft.com/office/drawing/2010/main" val="0"/>
-              </a:ext>
-            </a:extLst>
-          </a:blip>
-          <a:stretch>
-            <a:fillRect/>
-          </a:stretch>
-        </p:blipFill>
-        <p:spPr>
-          <a:xfrm>
-            <a:off x="1404734" y="1179772"/>
-            <a:ext cx="9382531" cy="5491654"/>
-          </a:xfrm>
-        </p:spPr>
-      </p:pic>
-      <p:sp>
-        <p:nvSpPr>
-          <p:cNvPr id="6" name="Ribbon: Tilted Up 5">
-            <a:extLst>
-              <a:ext uri="{FF2B5EF4-FFF2-40B4-BE49-F238E27FC236}">
-                <a16:creationId xmlns:a16="http://schemas.microsoft.com/office/drawing/2014/main" id="{1CDD77C5-0943-43E6-BE97-28040998F954}"/>
-              </a:ext>
-            </a:extLst>
-          </p:cNvPr>
-          <p:cNvSpPr/>
-          <p:nvPr/>
-        </p:nvSpPr>
-        <p:spPr>
-          <a:xfrm>
-            <a:off x="1380204" y="458737"/>
-            <a:ext cx="1036950" cy="517873"/>
-          </a:xfrm>
-          <a:prstGeom prst="ribbon2">
-            <a:avLst/>
-          </a:prstGeom>
-        </p:spPr>
-        <p:style>
-          <a:lnRef idx="2">
-            <a:schemeClr val="accent1">
-              <a:shade val="50000"/>
-            </a:schemeClr>
-          </a:lnRef>
-          <a:fillRef idx="1">
-            <a:schemeClr val="accent1"/>
-          </a:fillRef>
-          <a:effectRef idx="0">
-            <a:schemeClr val="accent1"/>
-          </a:effectRef>
-          <a:fontRef idx="minor">
-            <a:schemeClr val="lt1"/>
-          </a:fontRef>
-        </p:style>
-        <p:txBody>
-          <a:bodyPr rtlCol="0" anchor="ctr"/>
-          <a:lstStyle/>
-          <a:p>
-            <a:pPr algn="ctr"/>
-            <a:r>
-              <a:rPr lang="fr-FR" sz="3200" dirty="0"/>
-              <a:t>2</a:t>
-            </a:r>
-          </a:p>
-        </p:txBody>
-      </p:sp>
-    </p:spTree>
-    <p:extLst>
-      <p:ext uri="{BB962C8B-B14F-4D97-AF65-F5344CB8AC3E}">
-        <p14:creationId xmlns:p14="http://schemas.microsoft.com/office/powerpoint/2010/main" val="2250849852"/>
-      </p:ext>
-    </p:extLst>
-  </p:cSld>
-  <p:clrMapOvr>
-    <a:masterClrMapping/>
-  </p:clrMapOvr>
-  <mc:AlternateContent xmlns:mc="http://schemas.openxmlformats.org/markup-compatibility/2006" xmlns:p15="http://schemas.microsoft.com/office/powerpoint/2012/main">
-    <mc:Choice Requires="p15">
-      <p:transition xmlns:p14="http://schemas.microsoft.com/office/powerpoint/2010/main" spd="slow" p14:dur="2000">
-        <p15:prstTrans prst="drape"/>
-      </p:transition>
-    </mc:Choice>
-    <mc:Fallback xmlns="">
-      <p:transition spd="slow">
-        <p:fade/>
-      </p:transition>
-    </mc:Fallback>
-  </mc:AlternateContent>
-</p:sld>
-</file>
-
-<file path=ppt/slides/slide5.xml><?xml version="1.0" encoding="utf-8"?>
-<p:sld xmlns:a="http://schemas.openxmlformats.org/drawingml/2006/main" xmlns:r="http://schemas.openxmlformats.org/officeDocument/2006/relationships" xmlns:p="http://schemas.openxmlformats.org/presentationml/2006/main">
-  <p:cSld>
-    <p:spTree>
-      <p:nvGrpSpPr>
-        <p:cNvPr id="1" name=""/>
-        <p:cNvGrpSpPr/>
-        <p:nvPr/>
-      </p:nvGrpSpPr>
-      <p:grpSpPr>
-        <a:xfrm>
-          <a:off x="0" y="0"/>
-          <a:ext cx="0" cy="0"/>
-          <a:chOff x="0" y="0"/>
-          <a:chExt cx="0" cy="0"/>
-        </a:xfrm>
-      </p:grpSpPr>
-      <p:sp>
-        <p:nvSpPr>
-          <p:cNvPr id="2" name="Title 1">
-            <a:extLst>
-              <a:ext uri="{FF2B5EF4-FFF2-40B4-BE49-F238E27FC236}">
-                <a16:creationId xmlns:a16="http://schemas.microsoft.com/office/drawing/2014/main" id="{A1CB2665-3E92-4E57-B0CD-2EE1B2626F92}"/>
-              </a:ext>
-            </a:extLst>
-          </p:cNvPr>
-          <p:cNvSpPr>
-            <a:spLocks noGrp="1"/>
-          </p:cNvSpPr>
-          <p:nvPr>
-            <p:ph type="title"/>
-          </p:nvPr>
-        </p:nvSpPr>
-        <p:spPr>
-          <a:xfrm>
-            <a:off x="8630915" y="410738"/>
-            <a:ext cx="3092115" cy="541762"/>
-          </a:xfrm>
-        </p:spPr>
-        <p:txBody>
-          <a:bodyPr>
-            <a:noAutofit/>
-          </a:bodyPr>
-          <a:lstStyle/>
-          <a:p>
-            <a:r>
-              <a:rPr lang="fr-FR" sz="3200" dirty="0"/>
-              <a:t>Maquette</a:t>
-            </a:r>
-          </a:p>
-        </p:txBody>
-      </p:sp>
-      <p:pic>
-        <p:nvPicPr>
-          <p:cNvPr id="6" name="Content Placeholder 5">
-            <a:extLst>
-              <a:ext uri="{FF2B5EF4-FFF2-40B4-BE49-F238E27FC236}">
-                <a16:creationId xmlns:a16="http://schemas.microsoft.com/office/drawing/2014/main" id="{037D09BD-4BF5-4E79-98FC-F4C65CEB47A5}"/>
-              </a:ext>
-            </a:extLst>
-          </p:cNvPr>
-          <p:cNvPicPr>
-            <a:picLocks noGrp="1" noChangeAspect="1"/>
-          </p:cNvPicPr>
-          <p:nvPr>
-            <p:ph idx="1"/>
-          </p:nvPr>
-        </p:nvPicPr>
-        <p:blipFill>
-          <a:blip r:embed="rId2">
-            <a:extLst>
-              <a:ext uri="{28A0092B-C50C-407E-A947-70E740481C1C}">
-                <a14:useLocalDpi xmlns:a14="http://schemas.microsoft.com/office/drawing/2010/main" val="0"/>
-              </a:ext>
-            </a:extLst>
-          </a:blip>
-          <a:stretch>
-            <a:fillRect/>
-          </a:stretch>
-        </p:blipFill>
-        <p:spPr>
-          <a:xfrm>
-            <a:off x="1075038" y="116304"/>
-            <a:ext cx="4707924" cy="6625391"/>
-          </a:xfrm>
-        </p:spPr>
-      </p:pic>
-      <p:sp>
-        <p:nvSpPr>
-          <p:cNvPr id="4" name="Text Placeholder 3">
-            <a:extLst>
-              <a:ext uri="{FF2B5EF4-FFF2-40B4-BE49-F238E27FC236}">
-                <a16:creationId xmlns:a16="http://schemas.microsoft.com/office/drawing/2014/main" id="{B2984584-1C26-4C2B-B70E-1D427516015E}"/>
-              </a:ext>
-            </a:extLst>
-          </p:cNvPr>
-          <p:cNvSpPr>
-            <a:spLocks noGrp="1"/>
-          </p:cNvSpPr>
-          <p:nvPr>
-            <p:ph type="body" sz="half" idx="2"/>
-          </p:nvPr>
-        </p:nvSpPr>
-        <p:spPr/>
-        <p:txBody>
-          <a:bodyPr/>
-          <a:lstStyle/>
-          <a:p>
-            <a:r>
-              <a:rPr lang="fr-FR" sz="2800" dirty="0"/>
-              <a:t>Logiciel :</a:t>
-            </a:r>
-          </a:p>
-          <a:p>
-            <a:r>
-              <a:rPr lang="fr-FR" sz="2800" dirty="0"/>
-              <a:t>- </a:t>
-            </a:r>
-            <a:r>
-              <a:rPr lang="fr-FR" sz="2800" dirty="0" err="1"/>
-              <a:t>Canva</a:t>
-            </a:r>
-            <a:endParaRPr lang="fr-FR" sz="2800" dirty="0"/>
-          </a:p>
-          <a:p>
-            <a:endParaRPr lang="fr-FR" dirty="0"/>
-          </a:p>
-        </p:txBody>
-      </p:sp>
-      <p:sp>
-        <p:nvSpPr>
-          <p:cNvPr id="7" name="Ribbon: Tilted Up 6">
-            <a:extLst>
-              <a:ext uri="{FF2B5EF4-FFF2-40B4-BE49-F238E27FC236}">
-                <a16:creationId xmlns:a16="http://schemas.microsoft.com/office/drawing/2014/main" id="{3E6E48FE-65FB-470A-9072-6CC0CD36A564}"/>
-              </a:ext>
-            </a:extLst>
-          </p:cNvPr>
-          <p:cNvSpPr/>
-          <p:nvPr/>
-        </p:nvSpPr>
-        <p:spPr>
-          <a:xfrm>
-            <a:off x="7886953" y="514304"/>
-            <a:ext cx="647404" cy="334630"/>
-          </a:xfrm>
-          <a:prstGeom prst="ribbon2">
-            <a:avLst/>
-          </a:prstGeom>
-        </p:spPr>
-        <p:style>
-          <a:lnRef idx="2">
-            <a:schemeClr val="accent1">
-              <a:shade val="50000"/>
-            </a:schemeClr>
-          </a:lnRef>
-          <a:fillRef idx="1">
-            <a:schemeClr val="accent1"/>
-          </a:fillRef>
-          <a:effectRef idx="0">
-            <a:schemeClr val="accent1"/>
-          </a:effectRef>
-          <a:fontRef idx="minor">
-            <a:schemeClr val="lt1"/>
-          </a:fontRef>
-        </p:style>
-        <p:txBody>
-          <a:bodyPr rtlCol="0" anchor="ctr"/>
-          <a:lstStyle/>
-          <a:p>
-            <a:pPr algn="ctr"/>
-            <a:r>
-              <a:rPr lang="fr-FR" sz="3200" dirty="0"/>
-              <a:t>3</a:t>
-            </a:r>
-          </a:p>
-        </p:txBody>
-      </p:sp>
-    </p:spTree>
-    <p:extLst>
-      <p:ext uri="{BB962C8B-B14F-4D97-AF65-F5344CB8AC3E}">
-        <p14:creationId xmlns:p14="http://schemas.microsoft.com/office/powerpoint/2010/main" val="3771034398"/>
-      </p:ext>
-    </p:extLst>
-  </p:cSld>
-  <p:clrMapOvr>
-    <a:masterClrMapping/>
-  </p:clrMapOvr>
-  <mc:AlternateContent xmlns:mc="http://schemas.openxmlformats.org/markup-compatibility/2006" xmlns:p15="http://schemas.microsoft.com/office/powerpoint/2012/main">
-    <mc:Choice Requires="p15">
-      <p:transition xmlns:p14="http://schemas.microsoft.com/office/powerpoint/2010/main" spd="slow" p14:dur="2000">
-        <p15:prstTrans prst="prestige"/>
-      </p:transition>
-    </mc:Choice>
-    <mc:Fallback xmlns="">
-      <p:transition spd="slow">
-        <p:fade/>
-      </p:transition>
-    </mc:Fallback>
-  </mc:AlternateContent>
-</p:sld>
-</file>
-
-<file path=ppt/slides/slide6.xml><?xml version="1.0" encoding="utf-8"?>
-<p:sld xmlns:a="http://schemas.openxmlformats.org/drawingml/2006/main" xmlns:r="http://schemas.openxmlformats.org/officeDocument/2006/relationships" xmlns:p="http://schemas.openxmlformats.org/presentationml/2006/main">
-  <p:cSld>
-    <p:spTree>
-      <p:nvGrpSpPr>
-        <p:cNvPr id="1" name=""/>
-        <p:cNvGrpSpPr/>
-        <p:nvPr/>
-      </p:nvGrpSpPr>
-      <p:grpSpPr>
-        <a:xfrm>
-          <a:off x="0" y="0"/>
-          <a:ext cx="0" cy="0"/>
-          <a:chOff x="0" y="0"/>
-          <a:chExt cx="0" cy="0"/>
-        </a:xfrm>
-      </p:grpSpPr>
-      <p:sp>
-        <p:nvSpPr>
-          <p:cNvPr id="2" name="Title 1">
-            <a:extLst>
-              <a:ext uri="{FF2B5EF4-FFF2-40B4-BE49-F238E27FC236}">
-                <a16:creationId xmlns:a16="http://schemas.microsoft.com/office/drawing/2014/main" id="{FC0C9C27-ADED-44AA-8535-6F3101735D17}"/>
-              </a:ext>
-            </a:extLst>
-          </p:cNvPr>
-          <p:cNvSpPr>
-            <a:spLocks noGrp="1"/>
-          </p:cNvSpPr>
-          <p:nvPr>
-            <p:ph type="title"/>
-          </p:nvPr>
-        </p:nvSpPr>
-        <p:spPr>
-          <a:xfrm>
-            <a:off x="8944434" y="569692"/>
-            <a:ext cx="3092115" cy="701370"/>
-          </a:xfrm>
-        </p:spPr>
-        <p:txBody>
-          <a:bodyPr>
-            <a:normAutofit/>
-          </a:bodyPr>
-          <a:lstStyle/>
-          <a:p>
-            <a:r>
-              <a:rPr lang="fr-FR" sz="3200" dirty="0"/>
-              <a:t>MCD</a:t>
-            </a:r>
-          </a:p>
-        </p:txBody>
-      </p:sp>
-      <p:pic>
-        <p:nvPicPr>
-          <p:cNvPr id="7" name="Content Placeholder 6">
-            <a:extLst>
-              <a:ext uri="{FF2B5EF4-FFF2-40B4-BE49-F238E27FC236}">
-                <a16:creationId xmlns:a16="http://schemas.microsoft.com/office/drawing/2014/main" id="{99F6043C-D8C2-4510-A588-9999669BFA72}"/>
-              </a:ext>
-            </a:extLst>
-          </p:cNvPr>
-          <p:cNvPicPr>
-            <a:picLocks noGrp="1" noChangeAspect="1"/>
-          </p:cNvPicPr>
-          <p:nvPr>
-            <p:ph idx="1"/>
-          </p:nvPr>
-        </p:nvPicPr>
-        <p:blipFill>
-          <a:blip r:embed="rId2">
-            <a:extLst>
-              <a:ext uri="{28A0092B-C50C-407E-A947-70E740481C1C}">
-                <a14:useLocalDpi xmlns:a14="http://schemas.microsoft.com/office/drawing/2010/main" val="0"/>
-              </a:ext>
-            </a:extLst>
-          </a:blip>
-          <a:stretch>
-            <a:fillRect/>
-          </a:stretch>
-        </p:blipFill>
-        <p:spPr>
-          <a:xfrm>
-            <a:off x="762000" y="500088"/>
-            <a:ext cx="6492582" cy="6136381"/>
-          </a:xfrm>
-        </p:spPr>
-      </p:pic>
-      <p:sp>
-        <p:nvSpPr>
-          <p:cNvPr id="4" name="Text Placeholder 3">
-            <a:extLst>
-              <a:ext uri="{FF2B5EF4-FFF2-40B4-BE49-F238E27FC236}">
-                <a16:creationId xmlns:a16="http://schemas.microsoft.com/office/drawing/2014/main" id="{BB8FD1E1-B85E-497C-B343-E4DCC604858C}"/>
-              </a:ext>
-            </a:extLst>
-          </p:cNvPr>
-          <p:cNvSpPr>
-            <a:spLocks noGrp="1"/>
-          </p:cNvSpPr>
-          <p:nvPr>
-            <p:ph type="body" sz="half" idx="2"/>
-          </p:nvPr>
-        </p:nvSpPr>
-        <p:spPr/>
-        <p:txBody>
-          <a:bodyPr>
-            <a:normAutofit/>
-          </a:bodyPr>
-          <a:lstStyle/>
-          <a:p>
-            <a:r>
-              <a:rPr lang="fr-FR" sz="2400" dirty="0"/>
-              <a:t>Logiciel :</a:t>
-            </a:r>
-          </a:p>
-          <a:p>
-            <a:r>
-              <a:rPr lang="fr-FR" sz="2400" dirty="0"/>
-              <a:t>- </a:t>
-            </a:r>
-            <a:r>
-              <a:rPr lang="fr-FR" sz="2400" dirty="0" err="1"/>
-              <a:t>Mocodo</a:t>
-            </a:r>
-            <a:endParaRPr lang="fr-FR" sz="2400" dirty="0"/>
-          </a:p>
-        </p:txBody>
-      </p:sp>
-      <p:sp>
-        <p:nvSpPr>
-          <p:cNvPr id="5" name="Ribbon: Tilted Up 4">
-            <a:extLst>
-              <a:ext uri="{FF2B5EF4-FFF2-40B4-BE49-F238E27FC236}">
-                <a16:creationId xmlns:a16="http://schemas.microsoft.com/office/drawing/2014/main" id="{CE737CDD-F8A4-468C-97E6-E2B2511093A3}"/>
-              </a:ext>
-            </a:extLst>
-          </p:cNvPr>
-          <p:cNvSpPr/>
-          <p:nvPr/>
-        </p:nvSpPr>
-        <p:spPr>
-          <a:xfrm>
-            <a:off x="7987647" y="758395"/>
-            <a:ext cx="700476" cy="388210"/>
-          </a:xfrm>
-          <a:prstGeom prst="ribbon2">
-            <a:avLst/>
-          </a:prstGeom>
-        </p:spPr>
-        <p:style>
-          <a:lnRef idx="2">
-            <a:schemeClr val="accent1">
-              <a:shade val="50000"/>
-            </a:schemeClr>
-          </a:lnRef>
-          <a:fillRef idx="1">
-            <a:schemeClr val="accent1"/>
-          </a:fillRef>
-          <a:effectRef idx="0">
-            <a:schemeClr val="accent1"/>
-          </a:effectRef>
-          <a:fontRef idx="minor">
-            <a:schemeClr val="lt1"/>
-          </a:fontRef>
-        </p:style>
-        <p:txBody>
-          <a:bodyPr rtlCol="0" anchor="ctr"/>
-          <a:lstStyle/>
-          <a:p>
-            <a:pPr algn="ctr"/>
-            <a:r>
-              <a:rPr lang="fr-FR" sz="3200" dirty="0"/>
-              <a:t>4</a:t>
-            </a:r>
-          </a:p>
-        </p:txBody>
-      </p:sp>
-    </p:spTree>
-    <p:extLst>
-      <p:ext uri="{BB962C8B-B14F-4D97-AF65-F5344CB8AC3E}">
-        <p14:creationId xmlns:p14="http://schemas.microsoft.com/office/powerpoint/2010/main" val="2609979086"/>
-      </p:ext>
-    </p:extLst>
-  </p:cSld>
-  <p:clrMapOvr>
-    <a:masterClrMapping/>
-  </p:clrMapOvr>
-  <mc:AlternateContent xmlns:mc="http://schemas.openxmlformats.org/markup-compatibility/2006" xmlns:p15="http://schemas.microsoft.com/office/powerpoint/2012/main">
-    <mc:Choice Requires="p15">
-      <p:transition xmlns:p14="http://schemas.microsoft.com/office/powerpoint/2010/main" spd="slow" p14:dur="1250">
-        <p15:prstTrans prst="pageCurlDouble"/>
-      </p:transition>
-    </mc:Choice>
-    <mc:Fallback xmlns="">
-      <p:transition spd="slow">
-        <p:fade/>
-      </p:transition>
-    </mc:Fallback>
-  </mc:AlternateContent>
-</p:sld>
-</file>
-
-<file path=ppt/slides/slide7.xml><?xml version="1.0" encoding="utf-8"?>
-<p:sld xmlns:a="http://schemas.openxmlformats.org/drawingml/2006/main" xmlns:r="http://schemas.openxmlformats.org/officeDocument/2006/relationships" xmlns:p="http://schemas.openxmlformats.org/presentationml/2006/main">
-  <p:cSld>
-    <p:spTree>
-      <p:nvGrpSpPr>
-        <p:cNvPr id="1" name=""/>
-        <p:cNvGrpSpPr/>
-        <p:nvPr/>
-      </p:nvGrpSpPr>
-      <p:grpSpPr>
-        <a:xfrm>
-          <a:off x="0" y="0"/>
-          <a:ext cx="0" cy="0"/>
-          <a:chOff x="0" y="0"/>
-          <a:chExt cx="0" cy="0"/>
-        </a:xfrm>
-      </p:grpSpPr>
-      <p:sp>
-        <p:nvSpPr>
-          <p:cNvPr id="2" name="Title 1">
-            <a:extLst>
-              <a:ext uri="{FF2B5EF4-FFF2-40B4-BE49-F238E27FC236}">
                 <a16:creationId xmlns:a16="http://schemas.microsoft.com/office/drawing/2014/main" id="{A27D5E58-41E4-419E-9DED-330D07883BDD}"/>
               </a:ext>
             </a:extLst>
@@ -17569,7 +17010,7 @@
             <a:pPr algn="ctr"/>
             <a:r>
               <a:rPr lang="fr-FR" sz="3200" dirty="0"/>
-              <a:t>5</a:t>
+              <a:t>2</a:t>
             </a:r>
           </a:p>
         </p:txBody>
@@ -17588,6 +17029,565 @@
     <mc:Choice Requires="p14">
       <p:transition spd="slow" p14:dur="3000">
         <p14:shred/>
+      </p:transition>
+    </mc:Choice>
+    <mc:Fallback xmlns="">
+      <p:transition spd="slow">
+        <p:fade/>
+      </p:transition>
+    </mc:Fallback>
+  </mc:AlternateContent>
+</p:sld>
+</file>
+
+<file path=ppt/slides/slide5.xml><?xml version="1.0" encoding="utf-8"?>
+<p:sld xmlns:a="http://schemas.openxmlformats.org/drawingml/2006/main" xmlns:r="http://schemas.openxmlformats.org/officeDocument/2006/relationships" xmlns:p="http://schemas.openxmlformats.org/presentationml/2006/main">
+  <p:cSld>
+    <p:spTree>
+      <p:nvGrpSpPr>
+        <p:cNvPr id="1" name=""/>
+        <p:cNvGrpSpPr/>
+        <p:nvPr/>
+      </p:nvGrpSpPr>
+      <p:grpSpPr>
+        <a:xfrm>
+          <a:off x="0" y="0"/>
+          <a:ext cx="0" cy="0"/>
+          <a:chOff x="0" y="0"/>
+          <a:chExt cx="0" cy="0"/>
+        </a:xfrm>
+      </p:grpSpPr>
+      <p:sp>
+        <p:nvSpPr>
+          <p:cNvPr id="2" name="Title 1">
+            <a:extLst>
+              <a:ext uri="{FF2B5EF4-FFF2-40B4-BE49-F238E27FC236}">
+                <a16:creationId xmlns:a16="http://schemas.microsoft.com/office/drawing/2014/main" id="{51E19303-39C9-49E1-9B63-CB0E4873C9ED}"/>
+              </a:ext>
+            </a:extLst>
+          </p:cNvPr>
+          <p:cNvSpPr>
+            <a:spLocks noGrp="1"/>
+          </p:cNvSpPr>
+          <p:nvPr>
+            <p:ph type="title"/>
+          </p:nvPr>
+        </p:nvSpPr>
+        <p:spPr/>
+        <p:txBody>
+          <a:bodyPr/>
+          <a:lstStyle/>
+          <a:p>
+            <a:r>
+              <a:rPr lang="fr-FR" dirty="0"/>
+              <a:t>	    planning</a:t>
+            </a:r>
+          </a:p>
+        </p:txBody>
+      </p:sp>
+      <p:pic>
+        <p:nvPicPr>
+          <p:cNvPr id="5" name="Content Placeholder 4">
+            <a:extLst>
+              <a:ext uri="{FF2B5EF4-FFF2-40B4-BE49-F238E27FC236}">
+                <a16:creationId xmlns:a16="http://schemas.microsoft.com/office/drawing/2014/main" id="{F35E130C-74BD-4E85-B425-04336B91E7BA}"/>
+              </a:ext>
+            </a:extLst>
+          </p:cNvPr>
+          <p:cNvPicPr>
+            <a:picLocks noGrp="1" noChangeAspect="1"/>
+          </p:cNvPicPr>
+          <p:nvPr>
+            <p:ph idx="1"/>
+          </p:nvPr>
+        </p:nvPicPr>
+        <p:blipFill>
+          <a:blip r:embed="rId2">
+            <a:extLst>
+              <a:ext uri="{28A0092B-C50C-407E-A947-70E740481C1C}">
+                <a14:useLocalDpi xmlns:a14="http://schemas.microsoft.com/office/drawing/2010/main" val="0"/>
+              </a:ext>
+            </a:extLst>
+          </a:blip>
+          <a:stretch>
+            <a:fillRect/>
+          </a:stretch>
+        </p:blipFill>
+        <p:spPr>
+          <a:xfrm>
+            <a:off x="1404734" y="1179772"/>
+            <a:ext cx="9382531" cy="5491654"/>
+          </a:xfrm>
+        </p:spPr>
+      </p:pic>
+      <p:sp>
+        <p:nvSpPr>
+          <p:cNvPr id="6" name="Ribbon: Tilted Up 5">
+            <a:extLst>
+              <a:ext uri="{FF2B5EF4-FFF2-40B4-BE49-F238E27FC236}">
+                <a16:creationId xmlns:a16="http://schemas.microsoft.com/office/drawing/2014/main" id="{1CDD77C5-0943-43E6-BE97-28040998F954}"/>
+              </a:ext>
+            </a:extLst>
+          </p:cNvPr>
+          <p:cNvSpPr/>
+          <p:nvPr/>
+        </p:nvSpPr>
+        <p:spPr>
+          <a:xfrm>
+            <a:off x="1380204" y="458737"/>
+            <a:ext cx="1036950" cy="517873"/>
+          </a:xfrm>
+          <a:prstGeom prst="ribbon2">
+            <a:avLst/>
+          </a:prstGeom>
+        </p:spPr>
+        <p:style>
+          <a:lnRef idx="2">
+            <a:schemeClr val="accent1">
+              <a:shade val="50000"/>
+            </a:schemeClr>
+          </a:lnRef>
+          <a:fillRef idx="1">
+            <a:schemeClr val="accent1"/>
+          </a:fillRef>
+          <a:effectRef idx="0">
+            <a:schemeClr val="accent1"/>
+          </a:effectRef>
+          <a:fontRef idx="minor">
+            <a:schemeClr val="lt1"/>
+          </a:fontRef>
+        </p:style>
+        <p:txBody>
+          <a:bodyPr rtlCol="0" anchor="ctr"/>
+          <a:lstStyle/>
+          <a:p>
+            <a:pPr algn="ctr"/>
+            <a:r>
+              <a:rPr lang="fr-FR" sz="3200" dirty="0"/>
+              <a:t>3</a:t>
+            </a:r>
+          </a:p>
+        </p:txBody>
+      </p:sp>
+    </p:spTree>
+    <p:extLst>
+      <p:ext uri="{BB962C8B-B14F-4D97-AF65-F5344CB8AC3E}">
+        <p14:creationId xmlns:p14="http://schemas.microsoft.com/office/powerpoint/2010/main" val="2250849852"/>
+      </p:ext>
+    </p:extLst>
+  </p:cSld>
+  <p:clrMapOvr>
+    <a:masterClrMapping/>
+  </p:clrMapOvr>
+  <mc:AlternateContent xmlns:mc="http://schemas.openxmlformats.org/markup-compatibility/2006" xmlns:p15="http://schemas.microsoft.com/office/powerpoint/2012/main">
+    <mc:Choice Requires="p15">
+      <p:transition xmlns:p14="http://schemas.microsoft.com/office/powerpoint/2010/main" spd="slow" p14:dur="2000">
+        <p15:prstTrans prst="drape"/>
+      </p:transition>
+    </mc:Choice>
+    <mc:Fallback xmlns="">
+      <p:transition spd="slow">
+        <p:fade/>
+      </p:transition>
+    </mc:Fallback>
+  </mc:AlternateContent>
+</p:sld>
+</file>
+
+<file path=ppt/slides/slide6.xml><?xml version="1.0" encoding="utf-8"?>
+<p:sld xmlns:a="http://schemas.openxmlformats.org/drawingml/2006/main" xmlns:r="http://schemas.openxmlformats.org/officeDocument/2006/relationships" xmlns:p="http://schemas.openxmlformats.org/presentationml/2006/main">
+  <p:cSld>
+    <p:spTree>
+      <p:nvGrpSpPr>
+        <p:cNvPr id="1" name=""/>
+        <p:cNvGrpSpPr/>
+        <p:nvPr/>
+      </p:nvGrpSpPr>
+      <p:grpSpPr>
+        <a:xfrm>
+          <a:off x="0" y="0"/>
+          <a:ext cx="0" cy="0"/>
+          <a:chOff x="0" y="0"/>
+          <a:chExt cx="0" cy="0"/>
+        </a:xfrm>
+      </p:grpSpPr>
+      <p:sp>
+        <p:nvSpPr>
+          <p:cNvPr id="2" name="Title 1">
+            <a:extLst>
+              <a:ext uri="{FF2B5EF4-FFF2-40B4-BE49-F238E27FC236}">
+                <a16:creationId xmlns:a16="http://schemas.microsoft.com/office/drawing/2014/main" id="{A1CB2665-3E92-4E57-B0CD-2EE1B2626F92}"/>
+              </a:ext>
+            </a:extLst>
+          </p:cNvPr>
+          <p:cNvSpPr>
+            <a:spLocks noGrp="1"/>
+          </p:cNvSpPr>
+          <p:nvPr>
+            <p:ph type="title"/>
+          </p:nvPr>
+        </p:nvSpPr>
+        <p:spPr>
+          <a:xfrm>
+            <a:off x="8630915" y="410738"/>
+            <a:ext cx="3092115" cy="541762"/>
+          </a:xfrm>
+        </p:spPr>
+        <p:txBody>
+          <a:bodyPr>
+            <a:noAutofit/>
+          </a:bodyPr>
+          <a:lstStyle/>
+          <a:p>
+            <a:r>
+              <a:rPr lang="fr-FR" sz="3200" dirty="0"/>
+              <a:t>Maquette</a:t>
+            </a:r>
+          </a:p>
+        </p:txBody>
+      </p:sp>
+      <p:pic>
+        <p:nvPicPr>
+          <p:cNvPr id="6" name="Content Placeholder 5">
+            <a:extLst>
+              <a:ext uri="{FF2B5EF4-FFF2-40B4-BE49-F238E27FC236}">
+                <a16:creationId xmlns:a16="http://schemas.microsoft.com/office/drawing/2014/main" id="{037D09BD-4BF5-4E79-98FC-F4C65CEB47A5}"/>
+              </a:ext>
+            </a:extLst>
+          </p:cNvPr>
+          <p:cNvPicPr>
+            <a:picLocks noGrp="1" noChangeAspect="1"/>
+          </p:cNvPicPr>
+          <p:nvPr>
+            <p:ph idx="1"/>
+          </p:nvPr>
+        </p:nvPicPr>
+        <p:blipFill>
+          <a:blip r:embed="rId2">
+            <a:extLst>
+              <a:ext uri="{28A0092B-C50C-407E-A947-70E740481C1C}">
+                <a14:useLocalDpi xmlns:a14="http://schemas.microsoft.com/office/drawing/2010/main" val="0"/>
+              </a:ext>
+            </a:extLst>
+          </a:blip>
+          <a:stretch>
+            <a:fillRect/>
+          </a:stretch>
+        </p:blipFill>
+        <p:spPr>
+          <a:xfrm>
+            <a:off x="1075038" y="116304"/>
+            <a:ext cx="4707924" cy="6625391"/>
+          </a:xfrm>
+        </p:spPr>
+      </p:pic>
+      <p:sp>
+        <p:nvSpPr>
+          <p:cNvPr id="4" name="Text Placeholder 3">
+            <a:extLst>
+              <a:ext uri="{FF2B5EF4-FFF2-40B4-BE49-F238E27FC236}">
+                <a16:creationId xmlns:a16="http://schemas.microsoft.com/office/drawing/2014/main" id="{B2984584-1C26-4C2B-B70E-1D427516015E}"/>
+              </a:ext>
+            </a:extLst>
+          </p:cNvPr>
+          <p:cNvSpPr>
+            <a:spLocks noGrp="1"/>
+          </p:cNvSpPr>
+          <p:nvPr>
+            <p:ph type="body" sz="half" idx="2"/>
+          </p:nvPr>
+        </p:nvSpPr>
+        <p:spPr/>
+        <p:txBody>
+          <a:bodyPr/>
+          <a:lstStyle/>
+          <a:p>
+            <a:r>
+              <a:rPr lang="fr-FR" sz="2800" dirty="0"/>
+              <a:t>Logiciel :</a:t>
+            </a:r>
+          </a:p>
+          <a:p>
+            <a:r>
+              <a:rPr lang="fr-FR" sz="2800" dirty="0"/>
+              <a:t>- </a:t>
+            </a:r>
+            <a:r>
+              <a:rPr lang="fr-FR" sz="2800" dirty="0" err="1"/>
+              <a:t>Canva</a:t>
+            </a:r>
+            <a:endParaRPr lang="fr-FR" sz="2800" dirty="0"/>
+          </a:p>
+          <a:p>
+            <a:endParaRPr lang="fr-FR" dirty="0"/>
+          </a:p>
+        </p:txBody>
+      </p:sp>
+      <p:sp>
+        <p:nvSpPr>
+          <p:cNvPr id="7" name="Ribbon: Tilted Up 6">
+            <a:extLst>
+              <a:ext uri="{FF2B5EF4-FFF2-40B4-BE49-F238E27FC236}">
+                <a16:creationId xmlns:a16="http://schemas.microsoft.com/office/drawing/2014/main" id="{3E6E48FE-65FB-470A-9072-6CC0CD36A564}"/>
+              </a:ext>
+            </a:extLst>
+          </p:cNvPr>
+          <p:cNvSpPr/>
+          <p:nvPr/>
+        </p:nvSpPr>
+        <p:spPr>
+          <a:xfrm>
+            <a:off x="7886953" y="514304"/>
+            <a:ext cx="647404" cy="334630"/>
+          </a:xfrm>
+          <a:prstGeom prst="ribbon2">
+            <a:avLst/>
+          </a:prstGeom>
+        </p:spPr>
+        <p:style>
+          <a:lnRef idx="2">
+            <a:schemeClr val="accent1">
+              <a:shade val="50000"/>
+            </a:schemeClr>
+          </a:lnRef>
+          <a:fillRef idx="1">
+            <a:schemeClr val="accent1"/>
+          </a:fillRef>
+          <a:effectRef idx="0">
+            <a:schemeClr val="accent1"/>
+          </a:effectRef>
+          <a:fontRef idx="minor">
+            <a:schemeClr val="lt1"/>
+          </a:fontRef>
+        </p:style>
+        <p:txBody>
+          <a:bodyPr rtlCol="0" anchor="ctr"/>
+          <a:lstStyle/>
+          <a:p>
+            <a:pPr algn="ctr"/>
+            <a:r>
+              <a:rPr lang="fr-FR" sz="3200" dirty="0"/>
+              <a:t>4</a:t>
+            </a:r>
+          </a:p>
+        </p:txBody>
+      </p:sp>
+    </p:spTree>
+    <p:extLst>
+      <p:ext uri="{BB962C8B-B14F-4D97-AF65-F5344CB8AC3E}">
+        <p14:creationId xmlns:p14="http://schemas.microsoft.com/office/powerpoint/2010/main" val="3771034398"/>
+      </p:ext>
+    </p:extLst>
+  </p:cSld>
+  <p:clrMapOvr>
+    <a:masterClrMapping/>
+  </p:clrMapOvr>
+  <mc:AlternateContent xmlns:mc="http://schemas.openxmlformats.org/markup-compatibility/2006" xmlns:p15="http://schemas.microsoft.com/office/powerpoint/2012/main">
+    <mc:Choice Requires="p15">
+      <p:transition xmlns:p14="http://schemas.microsoft.com/office/powerpoint/2010/main" spd="slow" p14:dur="2000">
+        <p15:prstTrans prst="prestige"/>
+      </p:transition>
+    </mc:Choice>
+    <mc:Fallback xmlns="">
+      <p:transition spd="slow">
+        <p:fade/>
+      </p:transition>
+    </mc:Fallback>
+  </mc:AlternateContent>
+</p:sld>
+</file>
+
+<file path=ppt/slides/slide7.xml><?xml version="1.0" encoding="utf-8"?>
+<p:sld xmlns:a="http://schemas.openxmlformats.org/drawingml/2006/main" xmlns:r="http://schemas.openxmlformats.org/officeDocument/2006/relationships" xmlns:p="http://schemas.openxmlformats.org/presentationml/2006/main">
+  <p:cSld>
+    <p:spTree>
+      <p:nvGrpSpPr>
+        <p:cNvPr id="1" name=""/>
+        <p:cNvGrpSpPr/>
+        <p:nvPr/>
+      </p:nvGrpSpPr>
+      <p:grpSpPr>
+        <a:xfrm>
+          <a:off x="0" y="0"/>
+          <a:ext cx="0" cy="0"/>
+          <a:chOff x="0" y="0"/>
+          <a:chExt cx="0" cy="0"/>
+        </a:xfrm>
+      </p:grpSpPr>
+      <p:sp>
+        <p:nvSpPr>
+          <p:cNvPr id="2" name="Title 1">
+            <a:extLst>
+              <a:ext uri="{FF2B5EF4-FFF2-40B4-BE49-F238E27FC236}">
+                <a16:creationId xmlns:a16="http://schemas.microsoft.com/office/drawing/2014/main" id="{FC0C9C27-ADED-44AA-8535-6F3101735D17}"/>
+              </a:ext>
+            </a:extLst>
+          </p:cNvPr>
+          <p:cNvSpPr>
+            <a:spLocks noGrp="1"/>
+          </p:cNvSpPr>
+          <p:nvPr>
+            <p:ph type="title"/>
+          </p:nvPr>
+        </p:nvSpPr>
+        <p:spPr>
+          <a:xfrm>
+            <a:off x="8944434" y="569692"/>
+            <a:ext cx="3092115" cy="701370"/>
+          </a:xfrm>
+        </p:spPr>
+        <p:txBody>
+          <a:bodyPr>
+            <a:normAutofit/>
+          </a:bodyPr>
+          <a:lstStyle/>
+          <a:p>
+            <a:r>
+              <a:rPr lang="fr-FR" sz="3200" dirty="0"/>
+              <a:t>MCD</a:t>
+            </a:r>
+          </a:p>
+        </p:txBody>
+      </p:sp>
+      <p:pic>
+        <p:nvPicPr>
+          <p:cNvPr id="7" name="Content Placeholder 6">
+            <a:extLst>
+              <a:ext uri="{FF2B5EF4-FFF2-40B4-BE49-F238E27FC236}">
+                <a16:creationId xmlns:a16="http://schemas.microsoft.com/office/drawing/2014/main" id="{99F6043C-D8C2-4510-A588-9999669BFA72}"/>
+              </a:ext>
+            </a:extLst>
+          </p:cNvPr>
+          <p:cNvPicPr>
+            <a:picLocks noGrp="1" noChangeAspect="1"/>
+          </p:cNvPicPr>
+          <p:nvPr>
+            <p:ph idx="1"/>
+          </p:nvPr>
+        </p:nvPicPr>
+        <p:blipFill>
+          <a:blip r:embed="rId2">
+            <a:extLst>
+              <a:ext uri="{28A0092B-C50C-407E-A947-70E740481C1C}">
+                <a14:useLocalDpi xmlns:a14="http://schemas.microsoft.com/office/drawing/2010/main" val="0"/>
+              </a:ext>
+            </a:extLst>
+          </a:blip>
+          <a:stretch>
+            <a:fillRect/>
+          </a:stretch>
+        </p:blipFill>
+        <p:spPr>
+          <a:xfrm>
+            <a:off x="762000" y="500088"/>
+            <a:ext cx="6492582" cy="6136381"/>
+          </a:xfrm>
+        </p:spPr>
+      </p:pic>
+      <p:sp>
+        <p:nvSpPr>
+          <p:cNvPr id="4" name="Text Placeholder 3">
+            <a:extLst>
+              <a:ext uri="{FF2B5EF4-FFF2-40B4-BE49-F238E27FC236}">
+                <a16:creationId xmlns:a16="http://schemas.microsoft.com/office/drawing/2014/main" id="{BB8FD1E1-B85E-497C-B343-E4DCC604858C}"/>
+              </a:ext>
+            </a:extLst>
+          </p:cNvPr>
+          <p:cNvSpPr>
+            <a:spLocks noGrp="1"/>
+          </p:cNvSpPr>
+          <p:nvPr>
+            <p:ph type="body" sz="half" idx="2"/>
+          </p:nvPr>
+        </p:nvSpPr>
+        <p:spPr/>
+        <p:txBody>
+          <a:bodyPr>
+            <a:normAutofit/>
+          </a:bodyPr>
+          <a:lstStyle/>
+          <a:p>
+            <a:r>
+              <a:rPr lang="fr-FR" sz="2400" dirty="0"/>
+              <a:t>Logiciel :</a:t>
+            </a:r>
+          </a:p>
+          <a:p>
+            <a:r>
+              <a:rPr lang="fr-FR" sz="2400" dirty="0"/>
+              <a:t>- </a:t>
+            </a:r>
+            <a:r>
+              <a:rPr lang="fr-FR" sz="2400" dirty="0" err="1"/>
+              <a:t>Mocodo</a:t>
+            </a:r>
+            <a:endParaRPr lang="fr-FR" sz="2400" dirty="0"/>
+          </a:p>
+        </p:txBody>
+      </p:sp>
+      <p:sp>
+        <p:nvSpPr>
+          <p:cNvPr id="5" name="Ribbon: Tilted Up 4">
+            <a:extLst>
+              <a:ext uri="{FF2B5EF4-FFF2-40B4-BE49-F238E27FC236}">
+                <a16:creationId xmlns:a16="http://schemas.microsoft.com/office/drawing/2014/main" id="{CE737CDD-F8A4-468C-97E6-E2B2511093A3}"/>
+              </a:ext>
+            </a:extLst>
+          </p:cNvPr>
+          <p:cNvSpPr/>
+          <p:nvPr/>
+        </p:nvSpPr>
+        <p:spPr>
+          <a:xfrm>
+            <a:off x="7987647" y="758395"/>
+            <a:ext cx="700476" cy="388210"/>
+          </a:xfrm>
+          <a:prstGeom prst="ribbon2">
+            <a:avLst/>
+          </a:prstGeom>
+        </p:spPr>
+        <p:style>
+          <a:lnRef idx="2">
+            <a:schemeClr val="accent1">
+              <a:shade val="50000"/>
+            </a:schemeClr>
+          </a:lnRef>
+          <a:fillRef idx="1">
+            <a:schemeClr val="accent1"/>
+          </a:fillRef>
+          <a:effectRef idx="0">
+            <a:schemeClr val="accent1"/>
+          </a:effectRef>
+          <a:fontRef idx="minor">
+            <a:schemeClr val="lt1"/>
+          </a:fontRef>
+        </p:style>
+        <p:txBody>
+          <a:bodyPr rtlCol="0" anchor="ctr"/>
+          <a:lstStyle/>
+          <a:p>
+            <a:pPr algn="ctr"/>
+            <a:r>
+              <a:rPr lang="fr-FR" sz="3200" dirty="0"/>
+              <a:t>5</a:t>
+            </a:r>
+          </a:p>
+        </p:txBody>
+      </p:sp>
+    </p:spTree>
+    <p:extLst>
+      <p:ext uri="{BB962C8B-B14F-4D97-AF65-F5344CB8AC3E}">
+        <p14:creationId xmlns:p14="http://schemas.microsoft.com/office/powerpoint/2010/main" val="2609979086"/>
+      </p:ext>
+    </p:extLst>
+  </p:cSld>
+  <p:clrMapOvr>
+    <a:masterClrMapping/>
+  </p:clrMapOvr>
+  <mc:AlternateContent xmlns:mc="http://schemas.openxmlformats.org/markup-compatibility/2006" xmlns:p15="http://schemas.microsoft.com/office/powerpoint/2012/main">
+    <mc:Choice Requires="p15">
+      <p:transition xmlns:p14="http://schemas.microsoft.com/office/powerpoint/2010/main" spd="slow" p14:dur="1250">
+        <p15:prstTrans prst="pageCurlDouble"/>
       </p:transition>
     </mc:Choice>
     <mc:Fallback xmlns="">

</xml_diff>